<commit_message>
Correct typo in slide introducing network layer
</commit_message>
<xml_diff>
--- a/ex/352-S21/staging/352-S21/lectures/network-addressing.pptx
+++ b/ex/352-S21/staging/352-S21/lectures/network-addressing.pptx
@@ -222,7 +222,7 @@
           <a:p>
             <a:fld id="{973C490B-630B-7F46-B6FE-05D0FD1689A8}" type="datetimeFigureOut">
               <a:rPr lang="en-US" smtClean="0"/>
-              <a:t>3/13/21</a:t>
+              <a:t>3/14/21</a:t>
             </a:fld>
             <a:endParaRPr lang="en-US"/>
           </a:p>
@@ -1052,7 +1052,7 @@
           <a:p>
             <a:fld id="{DEDCE603-2B12-5844-BEA7-E98E825B38C7}" type="datetimeFigureOut">
               <a:rPr lang="en-US" smtClean="0"/>
-              <a:t>3/13/21</a:t>
+              <a:t>3/14/21</a:t>
             </a:fld>
             <a:endParaRPr lang="en-US"/>
           </a:p>
@@ -1250,7 +1250,7 @@
           <a:p>
             <a:fld id="{DEDCE603-2B12-5844-BEA7-E98E825B38C7}" type="datetimeFigureOut">
               <a:rPr lang="en-US" smtClean="0"/>
-              <a:t>3/13/21</a:t>
+              <a:t>3/14/21</a:t>
             </a:fld>
             <a:endParaRPr lang="en-US"/>
           </a:p>
@@ -1458,7 +1458,7 @@
           <a:p>
             <a:fld id="{DEDCE603-2B12-5844-BEA7-E98E825B38C7}" type="datetimeFigureOut">
               <a:rPr lang="en-US" smtClean="0"/>
-              <a:t>3/13/21</a:t>
+              <a:t>3/14/21</a:t>
             </a:fld>
             <a:endParaRPr lang="en-US"/>
           </a:p>
@@ -1667,7 +1667,7 @@
           <a:p>
             <a:fld id="{DEDCE603-2B12-5844-BEA7-E98E825B38C7}" type="datetimeFigureOut">
               <a:rPr lang="en-US" smtClean="0"/>
-              <a:t>3/13/21</a:t>
+              <a:t>3/14/21</a:t>
             </a:fld>
             <a:endParaRPr lang="en-US"/>
           </a:p>
@@ -1942,7 +1942,7 @@
           <a:p>
             <a:fld id="{DEDCE603-2B12-5844-BEA7-E98E825B38C7}" type="datetimeFigureOut">
               <a:rPr lang="en-US" smtClean="0"/>
-              <a:t>3/13/21</a:t>
+              <a:t>3/14/21</a:t>
             </a:fld>
             <a:endParaRPr lang="en-US"/>
           </a:p>
@@ -2207,7 +2207,7 @@
           <a:p>
             <a:fld id="{DEDCE603-2B12-5844-BEA7-E98E825B38C7}" type="datetimeFigureOut">
               <a:rPr lang="en-US" smtClean="0"/>
-              <a:t>3/13/21</a:t>
+              <a:t>3/14/21</a:t>
             </a:fld>
             <a:endParaRPr lang="en-US"/>
           </a:p>
@@ -2619,7 +2619,7 @@
           <a:p>
             <a:fld id="{DEDCE603-2B12-5844-BEA7-E98E825B38C7}" type="datetimeFigureOut">
               <a:rPr lang="en-US" smtClean="0"/>
-              <a:t>3/13/21</a:t>
+              <a:t>3/14/21</a:t>
             </a:fld>
             <a:endParaRPr lang="en-US"/>
           </a:p>
@@ -2760,7 +2760,7 @@
           <a:p>
             <a:fld id="{DEDCE603-2B12-5844-BEA7-E98E825B38C7}" type="datetimeFigureOut">
               <a:rPr lang="en-US" smtClean="0"/>
-              <a:t>3/13/21</a:t>
+              <a:t>3/14/21</a:t>
             </a:fld>
             <a:endParaRPr lang="en-US"/>
           </a:p>
@@ -2873,7 +2873,7 @@
           <a:p>
             <a:fld id="{DEDCE603-2B12-5844-BEA7-E98E825B38C7}" type="datetimeFigureOut">
               <a:rPr lang="en-US" smtClean="0"/>
-              <a:t>3/13/21</a:t>
+              <a:t>3/14/21</a:t>
             </a:fld>
             <a:endParaRPr lang="en-US"/>
           </a:p>
@@ -3184,7 +3184,7 @@
           <a:p>
             <a:fld id="{DEDCE603-2B12-5844-BEA7-E98E825B38C7}" type="datetimeFigureOut">
               <a:rPr lang="en-US" smtClean="0"/>
-              <a:t>3/13/21</a:t>
+              <a:t>3/14/21</a:t>
             </a:fld>
             <a:endParaRPr lang="en-US"/>
           </a:p>
@@ -3472,7 +3472,7 @@
           <a:p>
             <a:fld id="{DEDCE603-2B12-5844-BEA7-E98E825B38C7}" type="datetimeFigureOut">
               <a:rPr lang="en-US" smtClean="0"/>
-              <a:t>3/13/21</a:t>
+              <a:t>3/14/21</a:t>
             </a:fld>
             <a:endParaRPr lang="en-US"/>
           </a:p>
@@ -3713,7 +3713,7 @@
           <a:p>
             <a:fld id="{DEDCE603-2B12-5844-BEA7-E98E825B38C7}" type="datetimeFigureOut">
               <a:rPr lang="en-US" smtClean="0"/>
-              <a:t>3/13/21</a:t>
+              <a:t>3/14/21</a:t>
             </a:fld>
             <a:endParaRPr lang="en-US"/>
           </a:p>
@@ -17507,7 +17507,7 @@
           <a:p>
             <a:r>
               <a:rPr lang="en-US" dirty="0"/>
-              <a:t>Transport</a:t>
+              <a:t>Network</a:t>
             </a:r>
           </a:p>
         </p:txBody>
@@ -27504,14 +27504,14 @@
           </a:ln>
           <a:extLst>
             <a:ext uri="{909E8E84-426E-40dd-AFC4-6F175D3DCCD1}">
-              <a14:hiddenFill xmlns="" xmlns:a14="http://schemas.microsoft.com/office/drawing/2010/main">
+              <a14:hiddenFill xmlns:a14="http://schemas.microsoft.com/office/drawing/2010/main" xmlns="">
                 <a:solidFill>
                   <a:srgbClr val="FFFFFF"/>
                 </a:solidFill>
               </a14:hiddenFill>
             </a:ext>
             <a:ext uri="{91240B29-F687-4f45-9708-019B960494DF}">
-              <a14:hiddenLine xmlns="" xmlns:a14="http://schemas.microsoft.com/office/drawing/2010/main" w="9525">
+              <a14:hiddenLine xmlns:a14="http://schemas.microsoft.com/office/drawing/2010/main" xmlns="" w="9525">
                 <a:solidFill>
                   <a:srgbClr val="000000"/>
                 </a:solidFill>
@@ -27661,14 +27661,14 @@
           </a:ln>
           <a:extLst>
             <a:ext uri="{909E8E84-426E-40dd-AFC4-6F175D3DCCD1}">
-              <a14:hiddenFill xmlns="" xmlns:a14="http://schemas.microsoft.com/office/drawing/2010/main">
+              <a14:hiddenFill xmlns:a14="http://schemas.microsoft.com/office/drawing/2010/main" xmlns="">
                 <a:solidFill>
                   <a:srgbClr val="FFFFFF"/>
                 </a:solidFill>
               </a14:hiddenFill>
             </a:ext>
             <a:ext uri="{91240B29-F687-4f45-9708-019B960494DF}">
-              <a14:hiddenLine xmlns="" xmlns:a14="http://schemas.microsoft.com/office/drawing/2010/main" w="9525">
+              <a14:hiddenLine xmlns:a14="http://schemas.microsoft.com/office/drawing/2010/main" xmlns="" w="9525">
                 <a:solidFill>
                   <a:srgbClr val="000000"/>
                 </a:solidFill>

</xml_diff>